<commit_message>
Draft of introduction uploaded
</commit_message>
<xml_diff>
--- a/presentations/Topic Proposal Presentation.pptx
+++ b/presentations/Topic Proposal Presentation.pptx
@@ -15,6 +15,7 @@
     <p:sldId id="265" r:id="rId9"/>
     <p:sldId id="266" r:id="rId10"/>
     <p:sldId id="267" r:id="rId11"/>
+    <p:sldId id="268" r:id="rId12"/>
   </p:sldIdLst>
   <p:sldSz cx="12192000" cy="6858000"/>
   <p:notesSz cx="6858000" cy="9144000"/>
@@ -113,6 +114,11 @@
       </a:defRPr>
     </a:lvl9pPr>
   </p:defaultTextStyle>
+  <p:extLst>
+    <p:ext uri="{EFAFB233-063F-42B5-8137-9DF3F51BA10A}">
+      <p15:sldGuideLst xmlns:p15="http://schemas.microsoft.com/office/powerpoint/2012/main"/>
+    </p:ext>
+  </p:extLst>
 </p:presentation>
 </file>
 
@@ -6016,13 +6022,13 @@
           <a:p>
             <a:r>
               <a:rPr lang="en-US" altLang="zh-CN" dirty="0"/>
-              <a:t>I might find evidence the relationship between reliance and inequality would be different for countries with high/low reliance. It’s possible that for a specific group there is significant evidence but for another, it’s not.</a:t>
+              <a:t>I might find evidence the relationship between reliance and inequality would be different for countries with high/low reliance. Might be more significant in countries with higher reliance. It’s possible that for a specific group there is significant evidence but for another it’s not.</a:t>
             </a:r>
           </a:p>
           <a:p>
             <a:r>
               <a:rPr lang="en-US" altLang="zh-CN" dirty="0"/>
-              <a:t>Regional effects are expected to be significant.</a:t>
+              <a:t>Regional and educational effects are expected to be significant.</a:t>
             </a:r>
             <a:endParaRPr lang="zh-CN" altLang="en-US" dirty="0"/>
           </a:p>
@@ -6032,6 +6038,219 @@
     <p:extLst>
       <p:ext uri="{BB962C8B-B14F-4D97-AF65-F5344CB8AC3E}">
         <p14:creationId xmlns:p14="http://schemas.microsoft.com/office/powerpoint/2010/main" val="3168923867"/>
+      </p:ext>
+    </p:extLst>
+  </p:cSld>
+  <p:clrMapOvr>
+    <a:masterClrMapping/>
+  </p:clrMapOvr>
+</p:sld>
+</file>
+
+<file path=ppt/slides/slide11.xml><?xml version="1.0" encoding="utf-8"?>
+<p:sld xmlns:a="http://schemas.openxmlformats.org/drawingml/2006/main" xmlns:r="http://schemas.openxmlformats.org/officeDocument/2006/relationships" xmlns:p="http://schemas.openxmlformats.org/presentationml/2006/main">
+  <p:cSld>
+    <p:spTree>
+      <p:nvGrpSpPr>
+        <p:cNvPr id="1" name=""/>
+        <p:cNvGrpSpPr/>
+        <p:nvPr/>
+      </p:nvGrpSpPr>
+      <p:grpSpPr>
+        <a:xfrm>
+          <a:off x="0" y="0"/>
+          <a:ext cx="0" cy="0"/>
+          <a:chOff x="0" y="0"/>
+          <a:chExt cx="0" cy="0"/>
+        </a:xfrm>
+      </p:grpSpPr>
+      <p:sp>
+        <p:nvSpPr>
+          <p:cNvPr id="2" name="标题 1">
+            <a:extLst>
+              <a:ext uri="{FF2B5EF4-FFF2-40B4-BE49-F238E27FC236}">
+                <a16:creationId xmlns:a16="http://schemas.microsoft.com/office/drawing/2014/main" id="{B001F53B-0868-02A7-8905-723230074F99}"/>
+              </a:ext>
+            </a:extLst>
+          </p:cNvPr>
+          <p:cNvSpPr>
+            <a:spLocks noGrp="1"/>
+          </p:cNvSpPr>
+          <p:nvPr>
+            <p:ph type="title"/>
+          </p:nvPr>
+        </p:nvSpPr>
+        <p:spPr/>
+        <p:txBody>
+          <a:bodyPr/>
+          <a:lstStyle/>
+          <a:p>
+            <a:r>
+              <a:rPr lang="en-US" altLang="zh-CN" dirty="0"/>
+              <a:t>References</a:t>
+            </a:r>
+            <a:endParaRPr lang="zh-CN" altLang="en-US" dirty="0"/>
+          </a:p>
+        </p:txBody>
+      </p:sp>
+      <p:sp>
+        <p:nvSpPr>
+          <p:cNvPr id="3" name="内容占位符 2">
+            <a:extLst>
+              <a:ext uri="{FF2B5EF4-FFF2-40B4-BE49-F238E27FC236}">
+                <a16:creationId xmlns:a16="http://schemas.microsoft.com/office/drawing/2014/main" id="{464ABD0F-AB11-DD9D-1A08-6C77589DAE3A}"/>
+              </a:ext>
+            </a:extLst>
+          </p:cNvPr>
+          <p:cNvSpPr>
+            <a:spLocks noGrp="1"/>
+          </p:cNvSpPr>
+          <p:nvPr>
+            <p:ph idx="1"/>
+          </p:nvPr>
+        </p:nvSpPr>
+        <p:spPr/>
+        <p:txBody>
+          <a:bodyPr>
+            <a:normAutofit fontScale="62500" lnSpcReduction="20000"/>
+          </a:bodyPr>
+          <a:lstStyle/>
+          <a:p>
+            <a:r>
+              <a:rPr lang="en-US" altLang="zh-CN" dirty="0"/>
+              <a:t>Anwar, Amar, Colin F. </a:t>
+            </a:r>
+            <a:r>
+              <a:rPr lang="en-US" altLang="zh-CN" dirty="0" err="1"/>
+              <a:t>Mang</a:t>
+            </a:r>
+            <a:r>
+              <a:rPr lang="en-US" altLang="zh-CN" dirty="0"/>
+              <a:t>, and Sonia Plaza. 2024. "Remittances and Inequality: A Meta-Analytic Investigation." The World Economy 47 (6): 2664–2705. </a:t>
+            </a:r>
+            <a:r>
+              <a:rPr lang="en-US" altLang="zh-CN" dirty="0">
+                <a:hlinkClick r:id="rId2"/>
+              </a:rPr>
+              <a:t>https://doi.org/10.1111/twec.13558</a:t>
+            </a:r>
+            <a:r>
+              <a:rPr lang="en-US" altLang="zh-CN" dirty="0"/>
+              <a:t>.</a:t>
+            </a:r>
+          </a:p>
+          <a:p>
+            <a:r>
+              <a:rPr lang="en-US" altLang="zh-CN" dirty="0"/>
+              <a:t>Barham, Bradford, and Stephen Boucher. 1998. "Migration, Remittances, and Inequality: Estimating the Net Effects of Migration on Income Distribution." Journal of Development Economics 55 (2): 307–331. </a:t>
+            </a:r>
+            <a:r>
+              <a:rPr lang="en-US" altLang="zh-CN" dirty="0">
+                <a:hlinkClick r:id="rId3"/>
+              </a:rPr>
+              <a:t>https://doi.org/10.1016/S0304-3878(98)00038-4</a:t>
+            </a:r>
+            <a:r>
+              <a:rPr lang="en-US" altLang="zh-CN" dirty="0"/>
+              <a:t>.</a:t>
+            </a:r>
+          </a:p>
+          <a:p>
+            <a:r>
+              <a:rPr lang="en-US" altLang="zh-CN" dirty="0" err="1"/>
+              <a:t>Kratou</a:t>
+            </a:r>
+            <a:r>
+              <a:rPr lang="en-US" altLang="zh-CN" dirty="0"/>
+              <a:t>, </a:t>
+            </a:r>
+            <a:r>
+              <a:rPr lang="en-US" altLang="zh-CN" dirty="0" err="1"/>
+              <a:t>Hajer</a:t>
+            </a:r>
+            <a:r>
+              <a:rPr lang="en-US" altLang="zh-CN" dirty="0"/>
+              <a:t>, and </a:t>
+            </a:r>
+            <a:r>
+              <a:rPr lang="en-US" altLang="zh-CN" dirty="0" err="1"/>
+              <a:t>Najeh</a:t>
+            </a:r>
+            <a:r>
+              <a:rPr lang="en-US" altLang="zh-CN" dirty="0"/>
+              <a:t> </a:t>
+            </a:r>
+            <a:r>
+              <a:rPr lang="en-US" altLang="zh-CN" dirty="0" err="1"/>
+              <a:t>Khlass</a:t>
+            </a:r>
+            <a:r>
+              <a:rPr lang="en-US" altLang="zh-CN" dirty="0"/>
+              <a:t>. 2022. "Remittances, Income Inequality, and Brain Drain: An Empirical Investigation for the MENA Region." In Key Challenges and Policy Reforms in the MENA Region, edited by M. S. Ben Ali. Springer Nature Switzerland. </a:t>
+            </a:r>
+            <a:r>
+              <a:rPr lang="en-US" altLang="zh-CN" dirty="0">
+                <a:hlinkClick r:id="rId4"/>
+              </a:rPr>
+              <a:t>https://doi.org/10.1007/978-3-030-92133-0_5</a:t>
+            </a:r>
+            <a:r>
+              <a:rPr lang="en-US" altLang="zh-CN" dirty="0"/>
+              <a:t>.</a:t>
+            </a:r>
+          </a:p>
+          <a:p>
+            <a:r>
+              <a:rPr lang="en-US" altLang="zh-CN" dirty="0"/>
+              <a:t>Koechlin, Valerie, and Gianmarco León. 2006. "International Remittances and Income Inequality: An Empirical Investigation." Inter-American Development Bank, Research Department Working Paper #571. https://www.iadb.org.‌</a:t>
+            </a:r>
+          </a:p>
+          <a:p>
+            <a:r>
+              <a:rPr lang="en-US" altLang="zh-CN" dirty="0" err="1"/>
+              <a:t>Murodova</a:t>
+            </a:r>
+            <a:r>
+              <a:rPr lang="en-US" altLang="zh-CN" dirty="0"/>
+              <a:t>, </a:t>
+            </a:r>
+            <a:r>
+              <a:rPr lang="en-US" altLang="zh-CN" dirty="0" err="1"/>
+              <a:t>Sevilya</a:t>
+            </a:r>
+            <a:r>
+              <a:rPr lang="en-US" altLang="zh-CN" dirty="0"/>
+              <a:t>. 2018. "Impact of Remittances and International Migration on Poverty in Central Asia: The Cases of the Kyrgyz Republic, Tajikistan, and Uzbekistan." Journal of Applied Economics and Business Research 8, no. 1: 38-56.</a:t>
+            </a:r>
+          </a:p>
+          <a:p>
+            <a:r>
+              <a:rPr lang="en-US" altLang="zh-CN" dirty="0"/>
+              <a:t>Rodrigue, Yannick, and </a:t>
+            </a:r>
+            <a:r>
+              <a:rPr lang="en-US" altLang="zh-CN" dirty="0" err="1"/>
+              <a:t>Nanfosso</a:t>
+            </a:r>
+            <a:r>
+              <a:rPr lang="en-US" altLang="zh-CN" dirty="0"/>
+              <a:t> Roger </a:t>
+            </a:r>
+            <a:r>
+              <a:rPr lang="en-US" altLang="zh-CN" dirty="0" err="1"/>
+              <a:t>Tsafack</a:t>
+            </a:r>
+            <a:r>
+              <a:rPr lang="en-US" altLang="zh-CN" dirty="0"/>
+              <a:t>. 2020. “Remittances, Financial Inclusion and Income Inequality in Africa.” MPRA Paper, April.</a:t>
+            </a:r>
+          </a:p>
+        </p:txBody>
+      </p:sp>
+    </p:spTree>
+    <p:extLst>
+      <p:ext uri="{BB962C8B-B14F-4D97-AF65-F5344CB8AC3E}">
+        <p14:creationId xmlns:p14="http://schemas.microsoft.com/office/powerpoint/2010/main" val="565686540"/>
       </p:ext>
     </p:extLst>
   </p:cSld>
@@ -6216,7 +6435,39 @@
           <a:p>
             <a:r>
               <a:rPr lang="en-US" altLang="zh-CN" dirty="0"/>
-              <a:t>While this is true, there is a paper discussing the possibility of these families having a tendency of completely migrate to more developed countries rather than invest on their original countries </a:t>
+              <a:t>While this is true, paper from </a:t>
+            </a:r>
+            <a:r>
+              <a:rPr lang="en-US" altLang="zh-CN" dirty="0" err="1"/>
+              <a:t>Hajer</a:t>
+            </a:r>
+            <a:r>
+              <a:rPr lang="en-US" altLang="zh-CN" dirty="0"/>
+              <a:t> </a:t>
+            </a:r>
+            <a:r>
+              <a:rPr lang="en-US" altLang="zh-CN" dirty="0" err="1"/>
+              <a:t>Kratou</a:t>
+            </a:r>
+            <a:r>
+              <a:rPr lang="en-US" altLang="zh-CN" dirty="0"/>
+              <a:t> and </a:t>
+            </a:r>
+            <a:r>
+              <a:rPr lang="en-US" altLang="zh-CN" dirty="0" err="1"/>
+              <a:t>Najeh</a:t>
+            </a:r>
+            <a:r>
+              <a:rPr lang="en-US" altLang="zh-CN" dirty="0"/>
+              <a:t> </a:t>
+            </a:r>
+            <a:r>
+              <a:rPr lang="en-US" altLang="zh-CN" dirty="0" err="1"/>
+              <a:t>Khlass</a:t>
+            </a:r>
+            <a:r>
+              <a:rPr lang="en-US" altLang="zh-CN" dirty="0"/>
+              <a:t> discuss the possibility of these families having a tendency of completely migrate to more developed countries rather than invest on their original countries </a:t>
             </a:r>
             <a:endParaRPr lang="zh-CN" altLang="en-US" dirty="0"/>
           </a:p>
@@ -6306,7 +6557,7 @@
           <a:p>
             <a:r>
               <a:rPr lang="en-US" altLang="zh-CN" dirty="0"/>
-              <a:t>According to previous research, there is an inverted U-curve relationship between international remittances(frequency of migration) and income inequality. Countries with higher educational levels can more quickly reach the inequality-decreasing section of the relationship.</a:t>
+              <a:t>They found there is an inverted U-curve relationship between international remittances(frequency of migration) and income inequality. Countries with higher educational levels can more quickly reach the inequality-decreasing section of the relationship.</a:t>
             </a:r>
           </a:p>
           <a:p>
@@ -6525,6 +6776,12 @@
             <a:r>
               <a:rPr lang="en-US" altLang="zh-CN" dirty="0"/>
               <a:t>This paper includes research on specific countries whose economies highly rely on international remittance</a:t>
+            </a:r>
+          </a:p>
+          <a:p>
+            <a:r>
+              <a:rPr lang="en-US" altLang="zh-CN" dirty="0"/>
+              <a:t>The result shows that the probability of falling into poverty decreases by 12% in Tajikistan, 8.58% in Kyrgyzstan, and 23.15% in Uzbekistan for households receiving remittances.</a:t>
             </a:r>
             <a:endParaRPr lang="zh-CN" altLang="en-US" dirty="0"/>
           </a:p>

</xml_diff>